<commit_message>
Update the 24 game wiki link
</commit_message>
<xml_diff>
--- a/2023-03-20/problem.pptx
+++ b/2023-03-20/problem.pptx
@@ -5983,7 +5983,17 @@
           <a:p>
             <a:r>
               <a:rPr lang="en-US" dirty="0"/>
-              <a:t>Compute 24 using all four numbers with addition, subtraction, multiplication and division.  Numbers can be moved around.</a:t>
+              <a:t>Play the </a:t>
+            </a:r>
+            <a:r>
+              <a:rPr lang="en-US" dirty="0">
+                <a:hlinkClick r:id="rId2"/>
+              </a:rPr>
+              <a:t>24 game</a:t>
+            </a:r>
+            <a:r>
+              <a:rPr lang="en-US" dirty="0"/>
+              <a:t> using the following numbers</a:t>
             </a:r>
           </a:p>
         </p:txBody>

</xml_diff>